<commit_message>
update day 3 content
</commit_message>
<xml_diff>
--- a/day_3/day_3.pptx
+++ b/day_3/day_3.pptx
@@ -6,13 +6,14 @@
   </p:sldMasterIdLst>
   <p:sldIdLst>
     <p:sldId id="258" r:id="rId2"/>
-    <p:sldId id="259" r:id="rId3"/>
-    <p:sldId id="261" r:id="rId4"/>
-    <p:sldId id="260" r:id="rId5"/>
-    <p:sldId id="262" r:id="rId6"/>
-    <p:sldId id="263" r:id="rId7"/>
-    <p:sldId id="264" r:id="rId8"/>
-    <p:sldId id="257" r:id="rId9"/>
+    <p:sldId id="267" r:id="rId3"/>
+    <p:sldId id="266" r:id="rId4"/>
+    <p:sldId id="259" r:id="rId5"/>
+    <p:sldId id="261" r:id="rId6"/>
+    <p:sldId id="260" r:id="rId7"/>
+    <p:sldId id="262" r:id="rId8"/>
+    <p:sldId id="265" r:id="rId9"/>
+    <p:sldId id="264" r:id="rId10"/>
   </p:sldIdLst>
   <p:sldSz cx="12192000" cy="6858000"/>
   <p:notesSz cx="6858000" cy="9144000"/>
@@ -266,7 +267,7 @@
           <a:p>
             <a:fld id="{B379E729-857E-4B18-8CDF-E57BD210DF26}" type="datetimeFigureOut">
               <a:rPr lang="en-US" smtClean="0"/>
-              <a:t>10/11/23</a:t>
+              <a:t>10/22/23</a:t>
             </a:fld>
             <a:endParaRPr lang="en-US"/>
           </a:p>
@@ -464,7 +465,7 @@
           <a:p>
             <a:fld id="{B379E729-857E-4B18-8CDF-E57BD210DF26}" type="datetimeFigureOut">
               <a:rPr lang="en-US" smtClean="0"/>
-              <a:t>10/11/23</a:t>
+              <a:t>10/22/23</a:t>
             </a:fld>
             <a:endParaRPr lang="en-US"/>
           </a:p>
@@ -672,7 +673,7 @@
           <a:p>
             <a:fld id="{B379E729-857E-4B18-8CDF-E57BD210DF26}" type="datetimeFigureOut">
               <a:rPr lang="en-US" smtClean="0"/>
-              <a:t>10/11/23</a:t>
+              <a:t>10/22/23</a:t>
             </a:fld>
             <a:endParaRPr lang="en-US"/>
           </a:p>
@@ -870,7 +871,7 @@
           <a:p>
             <a:fld id="{B379E729-857E-4B18-8CDF-E57BD210DF26}" type="datetimeFigureOut">
               <a:rPr lang="en-US" smtClean="0"/>
-              <a:t>10/11/23</a:t>
+              <a:t>10/22/23</a:t>
             </a:fld>
             <a:endParaRPr lang="en-US"/>
           </a:p>
@@ -1145,7 +1146,7 @@
           <a:p>
             <a:fld id="{B379E729-857E-4B18-8CDF-E57BD210DF26}" type="datetimeFigureOut">
               <a:rPr lang="en-US" smtClean="0"/>
-              <a:t>10/11/23</a:t>
+              <a:t>10/22/23</a:t>
             </a:fld>
             <a:endParaRPr lang="en-US"/>
           </a:p>
@@ -1410,7 +1411,7 @@
           <a:p>
             <a:fld id="{B379E729-857E-4B18-8CDF-E57BD210DF26}" type="datetimeFigureOut">
               <a:rPr lang="en-US" smtClean="0"/>
-              <a:t>10/11/23</a:t>
+              <a:t>10/22/23</a:t>
             </a:fld>
             <a:endParaRPr lang="en-US"/>
           </a:p>
@@ -1822,7 +1823,7 @@
           <a:p>
             <a:fld id="{B379E729-857E-4B18-8CDF-E57BD210DF26}" type="datetimeFigureOut">
               <a:rPr lang="en-US" smtClean="0"/>
-              <a:t>10/11/23</a:t>
+              <a:t>10/22/23</a:t>
             </a:fld>
             <a:endParaRPr lang="en-US"/>
           </a:p>
@@ -1963,7 +1964,7 @@
           <a:p>
             <a:fld id="{B379E729-857E-4B18-8CDF-E57BD210DF26}" type="datetimeFigureOut">
               <a:rPr lang="en-US" smtClean="0"/>
-              <a:t>10/11/23</a:t>
+              <a:t>10/22/23</a:t>
             </a:fld>
             <a:endParaRPr lang="en-US"/>
           </a:p>
@@ -2076,7 +2077,7 @@
           <a:p>
             <a:fld id="{B379E729-857E-4B18-8CDF-E57BD210DF26}" type="datetimeFigureOut">
               <a:rPr lang="en-US" smtClean="0"/>
-              <a:t>10/11/23</a:t>
+              <a:t>10/22/23</a:t>
             </a:fld>
             <a:endParaRPr lang="en-US"/>
           </a:p>
@@ -2387,7 +2388,7 @@
           <a:p>
             <a:fld id="{B379E729-857E-4B18-8CDF-E57BD210DF26}" type="datetimeFigureOut">
               <a:rPr lang="en-US" smtClean="0"/>
-              <a:t>10/11/23</a:t>
+              <a:t>10/22/23</a:t>
             </a:fld>
             <a:endParaRPr lang="en-US"/>
           </a:p>
@@ -2675,7 +2676,7 @@
           <a:p>
             <a:fld id="{B379E729-857E-4B18-8CDF-E57BD210DF26}" type="datetimeFigureOut">
               <a:rPr lang="en-US" smtClean="0"/>
-              <a:t>10/11/23</a:t>
+              <a:t>10/22/23</a:t>
             </a:fld>
             <a:endParaRPr lang="en-US"/>
           </a:p>
@@ -2916,7 +2917,7 @@
           <a:p>
             <a:fld id="{B379E729-857E-4B18-8CDF-E57BD210DF26}" type="datetimeFigureOut">
               <a:rPr lang="en-US" smtClean="0"/>
-              <a:t>10/11/23</a:t>
+              <a:t>10/22/23</a:t>
             </a:fld>
             <a:endParaRPr lang="en-US"/>
           </a:p>
@@ -3464,7 +3465,7 @@
           <p:cNvPr id="2" name="Title 1">
             <a:extLst>
               <a:ext uri="{FF2B5EF4-FFF2-40B4-BE49-F238E27FC236}">
-                <a16:creationId xmlns:a16="http://schemas.microsoft.com/office/drawing/2014/main" id="{ABE3C518-5F12-FC78-C1F8-746513F2B6A7}"/>
+                <a16:creationId xmlns:a16="http://schemas.microsoft.com/office/drawing/2014/main" id="{B76FEE74-4803-7423-9A97-7C5E6948CE70}"/>
               </a:ext>
             </a:extLst>
           </p:cNvPr>
@@ -3481,8 +3482,12 @@
           <a:lstStyle/>
           <a:p>
             <a:r>
-              <a:rPr lang="en-US" dirty="0"/>
-              <a:t>Enabling GitHub Copilot</a:t>
+              <a:rPr lang="en-US" dirty="0" err="1"/>
+              <a:t>Conda</a:t>
+            </a:r>
+            <a:r>
+              <a:rPr lang="en-US" dirty="0"/>
+              <a:t> Environment</a:t>
             </a:r>
           </a:p>
         </p:txBody>
@@ -3492,7 +3497,7 @@
           <p:cNvPr id="3" name="Content Placeholder 2">
             <a:extLst>
               <a:ext uri="{FF2B5EF4-FFF2-40B4-BE49-F238E27FC236}">
-                <a16:creationId xmlns:a16="http://schemas.microsoft.com/office/drawing/2014/main" id="{89C6F39A-3227-A521-3290-701BD05AB5AE}"/>
+                <a16:creationId xmlns:a16="http://schemas.microsoft.com/office/drawing/2014/main" id="{2D71F8BE-7936-FB2F-719C-6D67FD9C5784}"/>
               </a:ext>
             </a:extLst>
           </p:cNvPr>
@@ -3505,78 +3510,200 @@
         </p:nvSpPr>
         <p:spPr/>
         <p:txBody>
-          <a:bodyPr/>
-          <a:lstStyle/>
-          <a:p>
-            <a:r>
-              <a:rPr lang="en-US" dirty="0"/>
-              <a:t>Follow the instructions from:</a:t>
-            </a:r>
-            <a:br>
-              <a:rPr lang="en-US" dirty="0"/>
-            </a:br>
+          <a:bodyPr>
+            <a:normAutofit fontScale="92500" lnSpcReduction="20000"/>
+          </a:bodyPr>
+          <a:lstStyle/>
+          <a:p>
+            <a:r>
+              <a:rPr lang="en-US" dirty="0"/>
+              <a:t>A self-contained, isolated workspace where you can install and manage different packages and dependencies for a specific project or task</a:t>
+            </a:r>
+          </a:p>
+          <a:p>
+            <a:r>
+              <a:rPr lang="en-US" dirty="0"/>
+              <a:t>Avoid interference of different versions of python or packages</a:t>
+            </a:r>
+          </a:p>
+          <a:p>
+            <a:endParaRPr lang="en-US" dirty="0"/>
+          </a:p>
+          <a:p>
+            <a:pPr marL="0" indent="0">
+              <a:buNone/>
+            </a:pPr>
+            <a:r>
+              <a:rPr lang="en-US" dirty="0"/>
+              <a:t>Create:</a:t>
+            </a:r>
+          </a:p>
+          <a:p>
+            <a:pPr marL="0" indent="0">
+              <a:buNone/>
+            </a:pPr>
+            <a:r>
+              <a:rPr lang="en-US" sz="2800" dirty="0" err="1">
+                <a:solidFill>
+                  <a:schemeClr val="bg1">
+                    <a:lumMod val="75000"/>
+                  </a:schemeClr>
+                </a:solidFill>
+                <a:latin typeface="Consolas" panose="020B0609020204030204" pitchFamily="49" charset="0"/>
+                <a:cs typeface="Consolas" panose="020B0609020204030204" pitchFamily="49" charset="0"/>
+              </a:rPr>
+              <a:t>conda</a:t>
+            </a:r>
+            <a:r>
+              <a:rPr lang="en-US" sz="2800" dirty="0">
+                <a:solidFill>
+                  <a:schemeClr val="bg1">
+                    <a:lumMod val="75000"/>
+                  </a:schemeClr>
+                </a:solidFill>
+                <a:latin typeface="Consolas" panose="020B0609020204030204" pitchFamily="49" charset="0"/>
+                <a:cs typeface="Consolas" panose="020B0609020204030204" pitchFamily="49" charset="0"/>
+              </a:rPr>
+              <a:t> create -n &lt;</a:t>
+            </a:r>
+            <a:r>
+              <a:rPr lang="en-US" sz="2800" dirty="0" err="1">
+                <a:solidFill>
+                  <a:schemeClr val="bg1">
+                    <a:lumMod val="75000"/>
+                  </a:schemeClr>
+                </a:solidFill>
+                <a:latin typeface="Consolas" panose="020B0609020204030204" pitchFamily="49" charset="0"/>
+                <a:cs typeface="Consolas" panose="020B0609020204030204" pitchFamily="49" charset="0"/>
+              </a:rPr>
+              <a:t>env_name</a:t>
+            </a:r>
             <a:r>
               <a:rPr lang="en-US" dirty="0">
-                <a:hlinkClick r:id="rId2"/>
+                <a:solidFill>
+                  <a:schemeClr val="bg1">
+                    <a:lumMod val="75000"/>
+                  </a:schemeClr>
+                </a:solidFill>
+                <a:latin typeface="Consolas" panose="020B0609020204030204" pitchFamily="49" charset="0"/>
+                <a:cs typeface="Consolas" panose="020B0609020204030204" pitchFamily="49" charset="0"/>
               </a:rPr>
-              <a:t>https://docs.github.com/en/copilot/getting-started-with-github-copilot?tool=jetbrains</a:t>
-            </a:r>
-            <a:r>
-              <a:rPr lang="en-US" dirty="0"/>
-              <a:t> </a:t>
-            </a:r>
-          </a:p>
-          <a:p>
+              <a:t>&gt; python=3.9</a:t>
+            </a:r>
+          </a:p>
+          <a:p>
+            <a:pPr marL="0" indent="0">
+              <a:buNone/>
+            </a:pPr>
+            <a:r>
+              <a:rPr lang="en-US" dirty="0"/>
+              <a:t>Activate:</a:t>
+            </a:r>
+          </a:p>
+          <a:p>
+            <a:pPr marL="0" indent="0">
+              <a:buNone/>
+            </a:pPr>
+            <a:r>
+              <a:rPr lang="en-US" sz="2800" dirty="0" err="1">
+                <a:solidFill>
+                  <a:schemeClr val="bg1">
+                    <a:lumMod val="75000"/>
+                  </a:schemeClr>
+                </a:solidFill>
+                <a:latin typeface="Consolas" panose="020B0609020204030204" pitchFamily="49" charset="0"/>
+                <a:cs typeface="Consolas" panose="020B0609020204030204" pitchFamily="49" charset="0"/>
+              </a:rPr>
+              <a:t>conda</a:t>
+            </a:r>
+            <a:r>
+              <a:rPr lang="en-US" sz="2800" dirty="0">
+                <a:solidFill>
+                  <a:schemeClr val="bg1">
+                    <a:lumMod val="75000"/>
+                  </a:schemeClr>
+                </a:solidFill>
+                <a:latin typeface="Consolas" panose="020B0609020204030204" pitchFamily="49" charset="0"/>
+                <a:cs typeface="Consolas" panose="020B0609020204030204" pitchFamily="49" charset="0"/>
+              </a:rPr>
+              <a:t> activate &lt;</a:t>
+            </a:r>
+            <a:r>
+              <a:rPr lang="en-US" sz="2800" dirty="0" err="1">
+                <a:solidFill>
+                  <a:schemeClr val="bg1">
+                    <a:lumMod val="75000"/>
+                  </a:schemeClr>
+                </a:solidFill>
+                <a:latin typeface="Consolas" panose="020B0609020204030204" pitchFamily="49" charset="0"/>
+                <a:cs typeface="Consolas" panose="020B0609020204030204" pitchFamily="49" charset="0"/>
+              </a:rPr>
+              <a:t>env_name</a:t>
+            </a:r>
+            <a:r>
+              <a:rPr lang="en-US" sz="2800" dirty="0">
+                <a:solidFill>
+                  <a:schemeClr val="bg1">
+                    <a:lumMod val="75000"/>
+                  </a:schemeClr>
+                </a:solidFill>
+                <a:latin typeface="Consolas" panose="020B0609020204030204" pitchFamily="49" charset="0"/>
+                <a:cs typeface="Consolas" panose="020B0609020204030204" pitchFamily="49" charset="0"/>
+              </a:rPr>
+              <a:t>&gt;</a:t>
+            </a:r>
+          </a:p>
+          <a:p>
+            <a:pPr marL="0" indent="0">
+              <a:buNone/>
+            </a:pPr>
+            <a:r>
+              <a:rPr lang="en-US" dirty="0"/>
+              <a:t>Note 1: The environment activate will add the name of the environment at the beginning of the line.</a:t>
+            </a:r>
+          </a:p>
+          <a:p>
+            <a:pPr marL="0" indent="0">
+              <a:buNone/>
+            </a:pPr>
+            <a:r>
+              <a:rPr lang="en-US" dirty="0"/>
+              <a:t>Note 2: The default environment in </a:t>
+            </a:r>
+            <a:r>
+              <a:rPr lang="en-US" dirty="0" err="1"/>
+              <a:t>conda</a:t>
+            </a:r>
+            <a:r>
+              <a:rPr lang="en-US" dirty="0"/>
+              <a:t> is called </a:t>
+            </a:r>
+            <a:r>
+              <a:rPr lang="en-US" sz="2800" dirty="0">
+                <a:solidFill>
+                  <a:schemeClr val="bg1">
+                    <a:lumMod val="75000"/>
+                  </a:schemeClr>
+                </a:solidFill>
+                <a:latin typeface="Consolas" panose="020B0609020204030204" pitchFamily="49" charset="0"/>
+                <a:cs typeface="Consolas" panose="020B0609020204030204" pitchFamily="49" charset="0"/>
+              </a:rPr>
+              <a:t>base</a:t>
+            </a:r>
             <a:endParaRPr lang="en-US" dirty="0"/>
           </a:p>
           <a:p>
-            <a:r>
-              <a:rPr lang="en-US" dirty="0"/>
-              <a:t>GitHub student developer pack:</a:t>
-            </a:r>
-            <a:br>
-              <a:rPr lang="en-US" dirty="0"/>
-            </a:br>
-            <a:r>
-              <a:rPr lang="en-US" dirty="0">
-                <a:hlinkClick r:id="rId3"/>
-              </a:rPr>
-              <a:t>https://education.github.com/pack</a:t>
-            </a:r>
+            <a:pPr marL="0" indent="0">
+              <a:buNone/>
+            </a:pPr>
             <a:endParaRPr lang="en-US" dirty="0"/>
-          </a:p>
-          <a:p>
-            <a:endParaRPr lang="en-US" dirty="0"/>
-          </a:p>
-          <a:p>
-            <a:r>
-              <a:rPr lang="en-US" dirty="0" err="1"/>
-              <a:t>Github</a:t>
-            </a:r>
-            <a:r>
-              <a:rPr lang="en-US" dirty="0"/>
-              <a:t> Copilot-X</a:t>
-            </a:r>
-            <a:br>
-              <a:rPr lang="en-US" dirty="0"/>
-            </a:br>
-            <a:r>
-              <a:rPr lang="en-US" dirty="0">
-                <a:hlinkClick r:id="rId4"/>
-              </a:rPr>
-              <a:t>https://github.com/features/preview/copilot-x</a:t>
-            </a:r>
-            <a:r>
-              <a:rPr lang="en-US" dirty="0"/>
-              <a:t> </a:t>
-            </a:r>
           </a:p>
         </p:txBody>
       </p:sp>
     </p:spTree>
     <p:extLst>
       <p:ext uri="{BB962C8B-B14F-4D97-AF65-F5344CB8AC3E}">
-        <p14:creationId xmlns:p14="http://schemas.microsoft.com/office/powerpoint/2010/main" val="1054929788"/>
+        <p14:creationId xmlns:p14="http://schemas.microsoft.com/office/powerpoint/2010/main" val="1598704784"/>
       </p:ext>
     </p:extLst>
   </p:cSld>
@@ -3608,7 +3735,7 @@
           <p:cNvPr id="2" name="Title 1">
             <a:extLst>
               <a:ext uri="{FF2B5EF4-FFF2-40B4-BE49-F238E27FC236}">
-                <a16:creationId xmlns:a16="http://schemas.microsoft.com/office/drawing/2014/main" id="{35ED3BBD-F6C6-3FD1-E2F3-0B84C65F38A8}"/>
+                <a16:creationId xmlns:a16="http://schemas.microsoft.com/office/drawing/2014/main" id="{345DADF9-C5E4-7173-4BE9-C42F6E82D0C5}"/>
               </a:ext>
             </a:extLst>
           </p:cNvPr>
@@ -3621,17 +3748,27 @@
         </p:nvSpPr>
         <p:spPr/>
         <p:txBody>
-          <a:bodyPr/>
+          <a:bodyPr>
+            <a:normAutofit/>
+          </a:bodyPr>
           <a:lstStyle/>
           <a:p>
             <a:r>
               <a:rPr lang="en-US" dirty="0" err="1"/>
-              <a:t>Jupyter</a:t>
-            </a:r>
-            <a:r>
-              <a:rPr lang="en-US" dirty="0"/>
-              <a:t> Notebook</a:t>
-            </a:r>
+              <a:t>Napari</a:t>
+            </a:r>
+            <a:r>
+              <a:rPr lang="en-US" dirty="0"/>
+              <a:t>:</a:t>
+            </a:r>
+            <a:br>
+              <a:rPr lang="en-US" dirty="0"/>
+            </a:br>
+            <a:r>
+              <a:rPr lang="en-US" sz="3100" dirty="0"/>
+              <a:t>A fast, interactive viewer for multi-dimensional images in Python</a:t>
+            </a:r>
+            <a:endParaRPr lang="en-US" dirty="0"/>
           </a:p>
         </p:txBody>
       </p:sp>
@@ -3640,7 +3777,7 @@
           <p:cNvPr id="3" name="Content Placeholder 2">
             <a:extLst>
               <a:ext uri="{FF2B5EF4-FFF2-40B4-BE49-F238E27FC236}">
-                <a16:creationId xmlns:a16="http://schemas.microsoft.com/office/drawing/2014/main" id="{3B16A8AA-9CB3-7ECE-5BE0-7CFA4319163B}"/>
+                <a16:creationId xmlns:a16="http://schemas.microsoft.com/office/drawing/2014/main" id="{73089F78-A327-E656-915B-FAEB17D852E2}"/>
               </a:ext>
             </a:extLst>
           </p:cNvPr>
@@ -3656,32 +3793,30 @@
           <a:bodyPr/>
           <a:lstStyle/>
           <a:p>
-            <a:r>
-              <a:rPr lang="en-US" dirty="0" err="1"/>
-              <a:t>Asf</a:t>
-            </a:r>
-            <a:endParaRPr lang="en-US" dirty="0"/>
-          </a:p>
-          <a:p>
-            <a:r>
-              <a:rPr lang="en-US" dirty="0"/>
-              <a:t>Install (</a:t>
-            </a:r>
+            <a:pPr algn="l"/>
             <a:r>
               <a:rPr lang="en-US" dirty="0">
                 <a:hlinkClick r:id="rId2"/>
               </a:rPr>
-              <a:t>https://jupyter.org/install</a:t>
-            </a:r>
-            <a:r>
-              <a:rPr lang="en-US" dirty="0"/>
-              <a:t>):</a:t>
+              <a:t>https://napari.org/stable/index.html</a:t>
+            </a:r>
+            <a:endParaRPr lang="en-US" dirty="0"/>
+          </a:p>
+          <a:p>
+            <a:pPr algn="l"/>
+            <a:endParaRPr lang="en-US" dirty="0"/>
+          </a:p>
+          <a:p>
+            <a:pPr algn="l"/>
+            <a:r>
+              <a:rPr lang="en-US" dirty="0"/>
+              <a:t>Install:</a:t>
             </a:r>
             <a:br>
               <a:rPr lang="en-US" dirty="0"/>
             </a:br>
             <a:r>
-              <a:rPr lang="en-US" dirty="0">
+              <a:rPr lang="en-US" sz="2600" dirty="0" err="1">
                 <a:solidFill>
                   <a:schemeClr val="bg1">
                     <a:lumMod val="75000"/>
@@ -3690,10 +3825,10 @@
                 <a:latin typeface="Consolas" panose="020B0609020204030204" pitchFamily="49" charset="0"/>
                 <a:cs typeface="Consolas" panose="020B0609020204030204" pitchFamily="49" charset="0"/>
               </a:rPr>
-              <a:t>Pip install </a:t>
-            </a:r>
-            <a:r>
-              <a:rPr lang="en-US" dirty="0" err="1">
+              <a:t>conda</a:t>
+            </a:r>
+            <a:r>
+              <a:rPr lang="en-US" sz="2600" dirty="0">
                 <a:solidFill>
                   <a:schemeClr val="bg1">
                     <a:lumMod val="75000"/>
@@ -3702,9 +3837,166 @@
                 <a:latin typeface="Consolas" panose="020B0609020204030204" pitchFamily="49" charset="0"/>
                 <a:cs typeface="Consolas" panose="020B0609020204030204" pitchFamily="49" charset="0"/>
               </a:rPr>
-              <a:t>jupyterlab</a:t>
-            </a:r>
-            <a:endParaRPr lang="en-US" sz="1100" dirty="0">
+              <a:t> create -y -n </a:t>
+            </a:r>
+            <a:r>
+              <a:rPr lang="en-US" sz="2600" dirty="0" err="1">
+                <a:solidFill>
+                  <a:schemeClr val="bg1">
+                    <a:lumMod val="75000"/>
+                  </a:schemeClr>
+                </a:solidFill>
+                <a:latin typeface="Consolas" panose="020B0609020204030204" pitchFamily="49" charset="0"/>
+                <a:cs typeface="Consolas" panose="020B0609020204030204" pitchFamily="49" charset="0"/>
+              </a:rPr>
+              <a:t>napari</a:t>
+            </a:r>
+            <a:r>
+              <a:rPr lang="en-US" sz="2600" dirty="0">
+                <a:solidFill>
+                  <a:schemeClr val="bg1">
+                    <a:lumMod val="75000"/>
+                  </a:schemeClr>
+                </a:solidFill>
+                <a:latin typeface="Consolas" panose="020B0609020204030204" pitchFamily="49" charset="0"/>
+                <a:cs typeface="Consolas" panose="020B0609020204030204" pitchFamily="49" charset="0"/>
+              </a:rPr>
+              <a:t>-env -c </a:t>
+            </a:r>
+            <a:r>
+              <a:rPr lang="en-US" sz="2600" dirty="0" err="1">
+                <a:solidFill>
+                  <a:schemeClr val="bg1">
+                    <a:lumMod val="75000"/>
+                  </a:schemeClr>
+                </a:solidFill>
+                <a:latin typeface="Consolas" panose="020B0609020204030204" pitchFamily="49" charset="0"/>
+                <a:cs typeface="Consolas" panose="020B0609020204030204" pitchFamily="49" charset="0"/>
+              </a:rPr>
+              <a:t>conda</a:t>
+            </a:r>
+            <a:r>
+              <a:rPr lang="en-US" sz="2600" dirty="0">
+                <a:solidFill>
+                  <a:schemeClr val="bg1">
+                    <a:lumMod val="75000"/>
+                  </a:schemeClr>
+                </a:solidFill>
+                <a:latin typeface="Consolas" panose="020B0609020204030204" pitchFamily="49" charset="0"/>
+                <a:cs typeface="Consolas" panose="020B0609020204030204" pitchFamily="49" charset="0"/>
+              </a:rPr>
+              <a:t>-forge python=3.9</a:t>
+            </a:r>
+            <a:br>
+              <a:rPr lang="en-US" sz="2600" dirty="0">
+                <a:solidFill>
+                  <a:schemeClr val="bg1">
+                    <a:lumMod val="75000"/>
+                  </a:schemeClr>
+                </a:solidFill>
+                <a:latin typeface="Consolas" panose="020B0609020204030204" pitchFamily="49" charset="0"/>
+                <a:cs typeface="Consolas" panose="020B0609020204030204" pitchFamily="49" charset="0"/>
+              </a:rPr>
+            </a:br>
+            <a:r>
+              <a:rPr lang="en-US" sz="2600" dirty="0" err="1">
+                <a:solidFill>
+                  <a:schemeClr val="bg1">
+                    <a:lumMod val="75000"/>
+                  </a:schemeClr>
+                </a:solidFill>
+                <a:latin typeface="Consolas" panose="020B0609020204030204" pitchFamily="49" charset="0"/>
+                <a:cs typeface="Consolas" panose="020B0609020204030204" pitchFamily="49" charset="0"/>
+              </a:rPr>
+              <a:t>conda</a:t>
+            </a:r>
+            <a:r>
+              <a:rPr lang="en-US" sz="2600" dirty="0">
+                <a:solidFill>
+                  <a:schemeClr val="bg1">
+                    <a:lumMod val="75000"/>
+                  </a:schemeClr>
+                </a:solidFill>
+                <a:latin typeface="Consolas" panose="020B0609020204030204" pitchFamily="49" charset="0"/>
+                <a:cs typeface="Consolas" panose="020B0609020204030204" pitchFamily="49" charset="0"/>
+              </a:rPr>
+              <a:t> activate </a:t>
+            </a:r>
+            <a:r>
+              <a:rPr lang="en-US" sz="2600" dirty="0" err="1">
+                <a:solidFill>
+                  <a:schemeClr val="bg1">
+                    <a:lumMod val="75000"/>
+                  </a:schemeClr>
+                </a:solidFill>
+                <a:latin typeface="Consolas" panose="020B0609020204030204" pitchFamily="49" charset="0"/>
+                <a:cs typeface="Consolas" panose="020B0609020204030204" pitchFamily="49" charset="0"/>
+              </a:rPr>
+              <a:t>napari</a:t>
+            </a:r>
+            <a:r>
+              <a:rPr lang="en-US" sz="2600" dirty="0">
+                <a:solidFill>
+                  <a:schemeClr val="bg1">
+                    <a:lumMod val="75000"/>
+                  </a:schemeClr>
+                </a:solidFill>
+                <a:latin typeface="Consolas" panose="020B0609020204030204" pitchFamily="49" charset="0"/>
+                <a:cs typeface="Consolas" panose="020B0609020204030204" pitchFamily="49" charset="0"/>
+              </a:rPr>
+              <a:t>-env</a:t>
+            </a:r>
+            <a:br>
+              <a:rPr lang="en-US" sz="2600" dirty="0">
+                <a:solidFill>
+                  <a:schemeClr val="bg1">
+                    <a:lumMod val="75000"/>
+                  </a:schemeClr>
+                </a:solidFill>
+                <a:latin typeface="Consolas" panose="020B0609020204030204" pitchFamily="49" charset="0"/>
+                <a:cs typeface="Consolas" panose="020B0609020204030204" pitchFamily="49" charset="0"/>
+              </a:rPr>
+            </a:br>
+            <a:r>
+              <a:rPr lang="en-US" sz="2600" dirty="0">
+                <a:solidFill>
+                  <a:schemeClr val="bg1">
+                    <a:lumMod val="75000"/>
+                  </a:schemeClr>
+                </a:solidFill>
+                <a:latin typeface="Consolas" panose="020B0609020204030204" pitchFamily="49" charset="0"/>
+                <a:cs typeface="Consolas" panose="020B0609020204030204" pitchFamily="49" charset="0"/>
+              </a:rPr>
+              <a:t>python -m pip install "</a:t>
+            </a:r>
+            <a:r>
+              <a:rPr lang="en-US" sz="2600" dirty="0" err="1">
+                <a:solidFill>
+                  <a:schemeClr val="bg1">
+                    <a:lumMod val="75000"/>
+                  </a:schemeClr>
+                </a:solidFill>
+                <a:latin typeface="Consolas" panose="020B0609020204030204" pitchFamily="49" charset="0"/>
+                <a:cs typeface="Consolas" panose="020B0609020204030204" pitchFamily="49" charset="0"/>
+              </a:rPr>
+              <a:t>napari</a:t>
+            </a:r>
+            <a:r>
+              <a:rPr lang="en-US" sz="2600" dirty="0">
+                <a:solidFill>
+                  <a:schemeClr val="bg1">
+                    <a:lumMod val="75000"/>
+                  </a:schemeClr>
+                </a:solidFill>
+                <a:latin typeface="Consolas" panose="020B0609020204030204" pitchFamily="49" charset="0"/>
+                <a:cs typeface="Consolas" panose="020B0609020204030204" pitchFamily="49" charset="0"/>
+              </a:rPr>
+              <a:t>[all]"</a:t>
+            </a:r>
+          </a:p>
+          <a:p>
+            <a:pPr algn="l"/>
+            <a:endParaRPr lang="en-US" sz="2600" dirty="0">
               <a:solidFill>
                 <a:schemeClr val="bg1">
                   <a:lumMod val="75000"/>
@@ -3715,9 +4007,32 @@
             </a:endParaRPr>
           </a:p>
           <a:p>
-            <a:pPr marL="0" indent="0">
-              <a:buNone/>
-            </a:pPr>
+            <a:pPr algn="l"/>
+            <a:r>
+              <a:rPr lang="en-US" dirty="0"/>
+              <a:t>Run:</a:t>
+            </a:r>
+            <a:br>
+              <a:rPr lang="en-US" dirty="0"/>
+            </a:br>
+            <a:r>
+              <a:rPr lang="en-US" sz="2800" dirty="0" err="1">
+                <a:solidFill>
+                  <a:schemeClr val="bg1">
+                    <a:lumMod val="75000"/>
+                  </a:schemeClr>
+                </a:solidFill>
+                <a:latin typeface="Consolas" panose="020B0609020204030204" pitchFamily="49" charset="0"/>
+                <a:cs typeface="Consolas" panose="020B0609020204030204" pitchFamily="49" charset="0"/>
+              </a:rPr>
+              <a:t>napari</a:t>
+            </a:r>
+            <a:br>
+              <a:rPr lang="en-US" dirty="0"/>
+            </a:br>
+            <a:endParaRPr lang="en-US" dirty="0"/>
+          </a:p>
+          <a:p>
             <a:endParaRPr lang="en-US" dirty="0"/>
           </a:p>
           <a:p>
@@ -3728,7 +4043,7 @@
     </p:spTree>
     <p:extLst>
       <p:ext uri="{BB962C8B-B14F-4D97-AF65-F5344CB8AC3E}">
-        <p14:creationId xmlns:p14="http://schemas.microsoft.com/office/powerpoint/2010/main" val="2382279390"/>
+        <p14:creationId xmlns:p14="http://schemas.microsoft.com/office/powerpoint/2010/main" val="4144557007"/>
       </p:ext>
     </p:extLst>
   </p:cSld>
@@ -3760,7 +4075,7 @@
           <p:cNvPr id="2" name="Title 1">
             <a:extLst>
               <a:ext uri="{FF2B5EF4-FFF2-40B4-BE49-F238E27FC236}">
-                <a16:creationId xmlns:a16="http://schemas.microsoft.com/office/drawing/2014/main" id="{CF303A7A-19F5-427F-7978-FE1BFEFAF747}"/>
+                <a16:creationId xmlns:a16="http://schemas.microsoft.com/office/drawing/2014/main" id="{ABE3C518-5F12-FC78-C1F8-746513F2B6A7}"/>
               </a:ext>
             </a:extLst>
           </p:cNvPr>
@@ -3778,13 +4093,8 @@
           <a:p>
             <a:r>
               <a:rPr lang="en-US" dirty="0"/>
-              <a:t>Google </a:t>
-            </a:r>
-            <a:r>
-              <a:rPr lang="en-US" dirty="0" err="1"/>
-              <a:t>CoLab</a:t>
-            </a:r>
-            <a:endParaRPr lang="en-US" dirty="0"/>
+              <a:t>Enabling GitHub Copilot</a:t>
+            </a:r>
           </a:p>
         </p:txBody>
       </p:sp>
@@ -3793,7 +4103,7 @@
           <p:cNvPr id="3" name="Content Placeholder 2">
             <a:extLst>
               <a:ext uri="{FF2B5EF4-FFF2-40B4-BE49-F238E27FC236}">
-                <a16:creationId xmlns:a16="http://schemas.microsoft.com/office/drawing/2014/main" id="{C7461220-9CE6-A447-D4BD-80D7C6E3A0DE}"/>
+                <a16:creationId xmlns:a16="http://schemas.microsoft.com/office/drawing/2014/main" id="{89C6F39A-3227-A521-3290-701BD05AB5AE}"/>
               </a:ext>
             </a:extLst>
           </p:cNvPr>
@@ -3806,125 +4116,70 @@
         </p:nvSpPr>
         <p:spPr/>
         <p:txBody>
-          <a:bodyPr>
-            <a:normAutofit fontScale="62500" lnSpcReduction="20000"/>
-          </a:bodyPr>
-          <a:lstStyle/>
-          <a:p>
-            <a:pPr marL="0" indent="0">
-              <a:buNone/>
-            </a:pPr>
-            <a:r>
-              <a:rPr lang="en-US" dirty="0"/>
-              <a:t>Free cloud-based platform provided by Google that allows users to write and execute Python code collaboratively in a web-based environment</a:t>
-            </a:r>
-          </a:p>
-          <a:p>
-            <a:pPr marL="0" indent="0">
-              <a:buNone/>
-            </a:pPr>
+          <a:bodyPr/>
+          <a:lstStyle/>
+          <a:p>
+            <a:r>
+              <a:rPr lang="en-US" dirty="0"/>
+              <a:t>Follow the instructions from:</a:t>
+            </a:r>
+            <a:br>
+              <a:rPr lang="en-US" dirty="0"/>
+            </a:br>
             <a:r>
               <a:rPr lang="en-US" dirty="0">
                 <a:hlinkClick r:id="rId2"/>
               </a:rPr>
-              <a:t>https://colab.google</a:t>
-            </a:r>
+              <a:t>https://docs.github.com/en/copilot/getting-started-with-github-copilot?tool=jetbrains</a:t>
+            </a:r>
+            <a:r>
+              <a:rPr lang="en-US" dirty="0"/>
+              <a:t> </a:t>
+            </a:r>
+          </a:p>
+          <a:p>
             <a:endParaRPr lang="en-US" dirty="0"/>
           </a:p>
           <a:p>
-            <a:pPr marL="0" indent="0">
-              <a:buNone/>
-            </a:pPr>
+            <a:r>
+              <a:rPr lang="en-US" dirty="0"/>
+              <a:t>GitHub student developer pack:</a:t>
+            </a:r>
+            <a:br>
+              <a:rPr lang="en-US" dirty="0"/>
+            </a:br>
             <a:r>
               <a:rPr lang="en-US" dirty="0">
                 <a:hlinkClick r:id="rId3"/>
               </a:rPr>
-              <a:t>https://colab.research.google.com</a:t>
+              <a:t>https://education.github.com/pack</a:t>
             </a:r>
             <a:endParaRPr lang="en-US" dirty="0"/>
           </a:p>
           <a:p>
-            <a:pPr marL="0" indent="0">
-              <a:buNone/>
-            </a:pPr>
-            <a:endParaRPr lang="en-US" sz="600" dirty="0"/>
+            <a:endParaRPr lang="en-US" dirty="0"/>
           </a:p>
           <a:p>
             <a:r>
               <a:rPr lang="en-US" dirty="0" err="1"/>
-              <a:t>Jupyter</a:t>
-            </a:r>
-            <a:r>
-              <a:rPr lang="en-US" dirty="0"/>
-              <a:t> Notebook Integration: </a:t>
-            </a:r>
-            <a:r>
-              <a:rPr lang="en-US" dirty="0" err="1"/>
-              <a:t>Jupyter</a:t>
-            </a:r>
-            <a:r>
-              <a:rPr lang="en-US" dirty="0"/>
-              <a:t> Notebook-like interface</a:t>
-            </a:r>
-          </a:p>
-          <a:p>
-            <a:r>
-              <a:rPr lang="en-US" dirty="0"/>
-              <a:t>Cloud-Based: Runs on Google's cloud infrastructure - Leverage Google's computational resources</a:t>
-            </a:r>
-          </a:p>
-          <a:p>
-            <a:r>
-              <a:rPr lang="en-US" dirty="0"/>
-              <a:t>Free Access to GPU/TPU: Valuable for machine learning enthusiasts</a:t>
-            </a:r>
-          </a:p>
-          <a:p>
-            <a:r>
-              <a:rPr lang="en-US" dirty="0"/>
-              <a:t>Collaboration: Real-time collaboration with others, similar to Google Docs</a:t>
-            </a:r>
-          </a:p>
-          <a:p>
-            <a:r>
-              <a:rPr lang="en-US" dirty="0"/>
-              <a:t>Pre-installed Libraries: </a:t>
-            </a:r>
-            <a:r>
-              <a:rPr lang="en-US" dirty="0" err="1"/>
-              <a:t>Colab</a:t>
-            </a:r>
-            <a:r>
-              <a:rPr lang="en-US" dirty="0"/>
-              <a:t> comes with many Python libraries pre-installed - NumPy, pandas, Matplotlib, and TensorFlow</a:t>
-            </a:r>
-          </a:p>
-          <a:p>
-            <a:r>
-              <a:rPr lang="en-US" dirty="0"/>
-              <a:t>Easy Data Access: Import data from various sources, including Google Drive, Google Sheets, and external URLs</a:t>
-            </a:r>
-          </a:p>
-          <a:p>
-            <a:r>
-              <a:rPr lang="en-US" dirty="0"/>
-              <a:t>Notebook Sharing: Share </a:t>
-            </a:r>
-            <a:r>
-              <a:rPr lang="en-US" dirty="0" err="1"/>
-              <a:t>Colab</a:t>
-            </a:r>
-            <a:r>
-              <a:rPr lang="en-US" dirty="0"/>
-              <a:t> notebooks with others by providing a link – </a:t>
-            </a:r>
-            <a:r>
-              <a:rPr lang="en-US" dirty="0" err="1"/>
-              <a:t>sseful</a:t>
-            </a:r>
-            <a:r>
-              <a:rPr lang="en-US" dirty="0"/>
-              <a:t> for sharing code, data analysis, tutorials…</a:t>
+              <a:t>Github</a:t>
+            </a:r>
+            <a:r>
+              <a:rPr lang="en-US" dirty="0"/>
+              <a:t> Copilot-X</a:t>
+            </a:r>
+            <a:br>
+              <a:rPr lang="en-US" dirty="0"/>
+            </a:br>
+            <a:r>
+              <a:rPr lang="en-US" dirty="0">
+                <a:hlinkClick r:id="rId4"/>
+              </a:rPr>
+              <a:t>https://github.com/features/preview/copilot-x</a:t>
+            </a:r>
+            <a:r>
+              <a:rPr lang="en-US" dirty="0"/>
+              <a:t> </a:t>
             </a:r>
           </a:p>
         </p:txBody>
@@ -3932,7 +4187,7 @@
     </p:spTree>
     <p:extLst>
       <p:ext uri="{BB962C8B-B14F-4D97-AF65-F5344CB8AC3E}">
-        <p14:creationId xmlns:p14="http://schemas.microsoft.com/office/powerpoint/2010/main" val="2183295112"/>
+        <p14:creationId xmlns:p14="http://schemas.microsoft.com/office/powerpoint/2010/main" val="1054929788"/>
       </p:ext>
     </p:extLst>
   </p:cSld>
@@ -3964,7 +4219,7 @@
           <p:cNvPr id="2" name="Title 1">
             <a:extLst>
               <a:ext uri="{FF2B5EF4-FFF2-40B4-BE49-F238E27FC236}">
-                <a16:creationId xmlns:a16="http://schemas.microsoft.com/office/drawing/2014/main" id="{2DABBDBF-418C-2E39-1FF5-CF3D4226E83D}"/>
+                <a16:creationId xmlns:a16="http://schemas.microsoft.com/office/drawing/2014/main" id="{35ED3BBD-F6C6-3FD1-E2F3-0B84C65F38A8}"/>
               </a:ext>
             </a:extLst>
           </p:cNvPr>
@@ -3981,8 +4236,12 @@
           <a:lstStyle/>
           <a:p>
             <a:r>
-              <a:rPr lang="en-US" dirty="0"/>
-              <a:t>Kaggle</a:t>
+              <a:rPr lang="en-US" dirty="0" err="1"/>
+              <a:t>Jupyter</a:t>
+            </a:r>
+            <a:r>
+              <a:rPr lang="en-US" dirty="0"/>
+              <a:t> Notebook</a:t>
             </a:r>
           </a:p>
         </p:txBody>
@@ -3992,7 +4251,7 @@
           <p:cNvPr id="3" name="Content Placeholder 2">
             <a:extLst>
               <a:ext uri="{FF2B5EF4-FFF2-40B4-BE49-F238E27FC236}">
-                <a16:creationId xmlns:a16="http://schemas.microsoft.com/office/drawing/2014/main" id="{11D62FEC-D569-9FF9-58E1-C83A04C79F64}"/>
+                <a16:creationId xmlns:a16="http://schemas.microsoft.com/office/drawing/2014/main" id="{3B16A8AA-9CB3-7ECE-5BE0-7CFA4319163B}"/>
               </a:ext>
             </a:extLst>
           </p:cNvPr>
@@ -4008,14 +4267,158 @@
           <a:bodyPr/>
           <a:lstStyle/>
           <a:p>
-            <a:endParaRPr lang="en-US"/>
+            <a:r>
+              <a:rPr lang="en-US" dirty="0"/>
+              <a:t>Install (</a:t>
+            </a:r>
+            <a:r>
+              <a:rPr lang="en-US" dirty="0">
+                <a:hlinkClick r:id="rId2"/>
+              </a:rPr>
+              <a:t>https://jupyter.org/install</a:t>
+            </a:r>
+            <a:r>
+              <a:rPr lang="en-US" dirty="0"/>
+              <a:t>):</a:t>
+            </a:r>
+            <a:br>
+              <a:rPr lang="en-US" dirty="0"/>
+            </a:br>
+            <a:r>
+              <a:rPr lang="en-US" dirty="0">
+                <a:solidFill>
+                  <a:schemeClr val="bg1">
+                    <a:lumMod val="75000"/>
+                  </a:schemeClr>
+                </a:solidFill>
+                <a:latin typeface="Consolas" panose="020B0609020204030204" pitchFamily="49" charset="0"/>
+                <a:cs typeface="Consolas" panose="020B0609020204030204" pitchFamily="49" charset="0"/>
+              </a:rPr>
+              <a:t>Pip install </a:t>
+            </a:r>
+            <a:r>
+              <a:rPr lang="en-US" dirty="0" err="1">
+                <a:solidFill>
+                  <a:schemeClr val="bg1">
+                    <a:lumMod val="75000"/>
+                  </a:schemeClr>
+                </a:solidFill>
+                <a:latin typeface="Consolas" panose="020B0609020204030204" pitchFamily="49" charset="0"/>
+                <a:cs typeface="Consolas" panose="020B0609020204030204" pitchFamily="49" charset="0"/>
+              </a:rPr>
+              <a:t>jupyter</a:t>
+            </a:r>
+            <a:endParaRPr lang="en-US" dirty="0">
+              <a:solidFill>
+                <a:schemeClr val="bg1">
+                  <a:lumMod val="75000"/>
+                </a:schemeClr>
+              </a:solidFill>
+              <a:latin typeface="Consolas" panose="020B0609020204030204" pitchFamily="49" charset="0"/>
+              <a:cs typeface="Consolas" panose="020B0609020204030204" pitchFamily="49" charset="0"/>
+            </a:endParaRPr>
+          </a:p>
+          <a:p>
+            <a:endParaRPr lang="en-US" dirty="0">
+              <a:solidFill>
+                <a:schemeClr val="bg1">
+                  <a:lumMod val="75000"/>
+                </a:schemeClr>
+              </a:solidFill>
+              <a:latin typeface="Consolas" panose="020B0609020204030204" pitchFamily="49" charset="0"/>
+              <a:cs typeface="Consolas" panose="020B0609020204030204" pitchFamily="49" charset="0"/>
+            </a:endParaRPr>
+          </a:p>
+          <a:p>
+            <a:r>
+              <a:rPr lang="en-US" dirty="0"/>
+              <a:t>Run (from command line/terminal):</a:t>
+            </a:r>
+            <a:br>
+              <a:rPr lang="en-US" dirty="0"/>
+            </a:br>
+            <a:r>
+              <a:rPr lang="en-US" dirty="0">
+                <a:solidFill>
+                  <a:schemeClr val="bg1">
+                    <a:lumMod val="75000"/>
+                  </a:schemeClr>
+                </a:solidFill>
+                <a:latin typeface="Consolas" panose="020B0609020204030204" pitchFamily="49" charset="0"/>
+                <a:cs typeface="Consolas" panose="020B0609020204030204" pitchFamily="49" charset="0"/>
+              </a:rPr>
+              <a:t>cd &lt;folder/containing/</a:t>
+            </a:r>
+            <a:r>
+              <a:rPr lang="en-US" dirty="0" err="1">
+                <a:solidFill>
+                  <a:schemeClr val="bg1">
+                    <a:lumMod val="75000"/>
+                  </a:schemeClr>
+                </a:solidFill>
+                <a:latin typeface="Consolas" panose="020B0609020204030204" pitchFamily="49" charset="0"/>
+                <a:cs typeface="Consolas" panose="020B0609020204030204" pitchFamily="49" charset="0"/>
+              </a:rPr>
+              <a:t>ipynb_file</a:t>
+            </a:r>
+            <a:r>
+              <a:rPr lang="en-US" dirty="0">
+                <a:solidFill>
+                  <a:schemeClr val="bg1">
+                    <a:lumMod val="75000"/>
+                  </a:schemeClr>
+                </a:solidFill>
+                <a:latin typeface="Consolas" panose="020B0609020204030204" pitchFamily="49" charset="0"/>
+                <a:cs typeface="Consolas" panose="020B0609020204030204" pitchFamily="49" charset="0"/>
+              </a:rPr>
+              <a:t>&gt;</a:t>
+            </a:r>
+            <a:br>
+              <a:rPr lang="en-US" dirty="0">
+                <a:solidFill>
+                  <a:schemeClr val="bg1">
+                    <a:lumMod val="75000"/>
+                  </a:schemeClr>
+                </a:solidFill>
+                <a:latin typeface="Consolas" panose="020B0609020204030204" pitchFamily="49" charset="0"/>
+                <a:cs typeface="Consolas" panose="020B0609020204030204" pitchFamily="49" charset="0"/>
+              </a:rPr>
+            </a:br>
+            <a:r>
+              <a:rPr lang="en-US" dirty="0" err="1">
+                <a:solidFill>
+                  <a:schemeClr val="bg1">
+                    <a:lumMod val="75000"/>
+                  </a:schemeClr>
+                </a:solidFill>
+                <a:latin typeface="Consolas" panose="020B0609020204030204" pitchFamily="49" charset="0"/>
+                <a:cs typeface="Consolas" panose="020B0609020204030204" pitchFamily="49" charset="0"/>
+              </a:rPr>
+              <a:t>jupyter</a:t>
+            </a:r>
+            <a:r>
+              <a:rPr lang="en-US" dirty="0">
+                <a:solidFill>
+                  <a:schemeClr val="bg1">
+                    <a:lumMod val="75000"/>
+                  </a:schemeClr>
+                </a:solidFill>
+                <a:latin typeface="Consolas" panose="020B0609020204030204" pitchFamily="49" charset="0"/>
+                <a:cs typeface="Consolas" panose="020B0609020204030204" pitchFamily="49" charset="0"/>
+              </a:rPr>
+              <a:t> notebook</a:t>
+            </a:r>
+            <a:endParaRPr lang="en-US" dirty="0"/>
+          </a:p>
+          <a:p>
+            <a:endParaRPr lang="en-US" dirty="0"/>
           </a:p>
         </p:txBody>
       </p:sp>
     </p:spTree>
     <p:extLst>
       <p:ext uri="{BB962C8B-B14F-4D97-AF65-F5344CB8AC3E}">
-        <p14:creationId xmlns:p14="http://schemas.microsoft.com/office/powerpoint/2010/main" val="637003358"/>
+        <p14:creationId xmlns:p14="http://schemas.microsoft.com/office/powerpoint/2010/main" val="2382279390"/>
       </p:ext>
     </p:extLst>
   </p:cSld>
@@ -4047,7 +4450,7 @@
           <p:cNvPr id="2" name="Title 1">
             <a:extLst>
               <a:ext uri="{FF2B5EF4-FFF2-40B4-BE49-F238E27FC236}">
-                <a16:creationId xmlns:a16="http://schemas.microsoft.com/office/drawing/2014/main" id="{020C52BF-3AB0-380B-0416-53A030C72257}"/>
+                <a16:creationId xmlns:a16="http://schemas.microsoft.com/office/drawing/2014/main" id="{CF303A7A-19F5-427F-7978-FE1BFEFAF747}"/>
               </a:ext>
             </a:extLst>
           </p:cNvPr>
@@ -4064,8 +4467,12 @@
           <a:lstStyle/>
           <a:p>
             <a:r>
+              <a:rPr lang="en-US" dirty="0"/>
+              <a:t>Google </a:t>
+            </a:r>
+            <a:r>
               <a:rPr lang="en-US" dirty="0" err="1"/>
-              <a:t>HuggingFace</a:t>
+              <a:t>CoLab</a:t>
             </a:r>
             <a:endParaRPr lang="en-US" dirty="0"/>
           </a:p>
@@ -4076,7 +4483,7 @@
           <p:cNvPr id="3" name="Content Placeholder 2">
             <a:extLst>
               <a:ext uri="{FF2B5EF4-FFF2-40B4-BE49-F238E27FC236}">
-                <a16:creationId xmlns:a16="http://schemas.microsoft.com/office/drawing/2014/main" id="{D19D19FD-5768-218D-CFFE-087E65F6221D}"/>
+                <a16:creationId xmlns:a16="http://schemas.microsoft.com/office/drawing/2014/main" id="{C7461220-9CE6-A447-D4BD-80D7C6E3A0DE}"/>
               </a:ext>
             </a:extLst>
           </p:cNvPr>
@@ -4089,17 +4496,133 @@
         </p:nvSpPr>
         <p:spPr/>
         <p:txBody>
-          <a:bodyPr/>
-          <a:lstStyle/>
-          <a:p>
-            <a:endParaRPr lang="en-US"/>
+          <a:bodyPr>
+            <a:normAutofit fontScale="62500" lnSpcReduction="20000"/>
+          </a:bodyPr>
+          <a:lstStyle/>
+          <a:p>
+            <a:pPr marL="0" indent="0">
+              <a:buNone/>
+            </a:pPr>
+            <a:r>
+              <a:rPr lang="en-US" dirty="0"/>
+              <a:t>Free cloud-based platform provided by Google that allows users to write and execute Python code collaboratively in a web-based environment</a:t>
+            </a:r>
+          </a:p>
+          <a:p>
+            <a:pPr marL="0" indent="0">
+              <a:buNone/>
+            </a:pPr>
+            <a:r>
+              <a:rPr lang="en-US" dirty="0">
+                <a:hlinkClick r:id="rId2"/>
+              </a:rPr>
+              <a:t>https://colab.google</a:t>
+            </a:r>
+            <a:endParaRPr lang="en-US" dirty="0"/>
+          </a:p>
+          <a:p>
+            <a:pPr marL="0" indent="0">
+              <a:buNone/>
+            </a:pPr>
+            <a:r>
+              <a:rPr lang="en-US" dirty="0">
+                <a:hlinkClick r:id="rId3"/>
+              </a:rPr>
+              <a:t>https://colab.research.google.com</a:t>
+            </a:r>
+            <a:endParaRPr lang="en-US" dirty="0"/>
+          </a:p>
+          <a:p>
+            <a:pPr marL="0" indent="0">
+              <a:buNone/>
+            </a:pPr>
+            <a:endParaRPr lang="en-US" sz="600" dirty="0"/>
+          </a:p>
+          <a:p>
+            <a:r>
+              <a:rPr lang="en-US" dirty="0" err="1"/>
+              <a:t>Jupyter</a:t>
+            </a:r>
+            <a:r>
+              <a:rPr lang="en-US" dirty="0"/>
+              <a:t> Notebook Integration: </a:t>
+            </a:r>
+            <a:r>
+              <a:rPr lang="en-US" dirty="0" err="1"/>
+              <a:t>Jupyter</a:t>
+            </a:r>
+            <a:r>
+              <a:rPr lang="en-US" dirty="0"/>
+              <a:t> Notebook-like interface</a:t>
+            </a:r>
+          </a:p>
+          <a:p>
+            <a:r>
+              <a:rPr lang="en-US" dirty="0"/>
+              <a:t>Cloud-Based: Runs on Google's cloud infrastructure - Leverage Google's computational resources</a:t>
+            </a:r>
+          </a:p>
+          <a:p>
+            <a:r>
+              <a:rPr lang="en-US" dirty="0"/>
+              <a:t>Free Access to GPU/TPU: Valuable for machine learning enthusiasts</a:t>
+            </a:r>
+          </a:p>
+          <a:p>
+            <a:r>
+              <a:rPr lang="en-US" dirty="0"/>
+              <a:t>Collaboration: Real-time collaboration with others, similar to Google Docs</a:t>
+            </a:r>
+          </a:p>
+          <a:p>
+            <a:r>
+              <a:rPr lang="en-US" dirty="0"/>
+              <a:t>Pre-installed Libraries: </a:t>
+            </a:r>
+            <a:r>
+              <a:rPr lang="en-US" dirty="0" err="1"/>
+              <a:t>Colab</a:t>
+            </a:r>
+            <a:r>
+              <a:rPr lang="en-US" dirty="0"/>
+              <a:t> comes with many Python libraries pre-installed - NumPy, pandas, Matplotlib, and TensorFlow</a:t>
+            </a:r>
+          </a:p>
+          <a:p>
+            <a:r>
+              <a:rPr lang="en-US" dirty="0"/>
+              <a:t>Easy Data Access: Import data from various sources, including Google Drive, Google Sheets, and external URLs</a:t>
+            </a:r>
+          </a:p>
+          <a:p>
+            <a:r>
+              <a:rPr lang="en-US" dirty="0"/>
+              <a:t>Notebook Sharing: Share </a:t>
+            </a:r>
+            <a:r>
+              <a:rPr lang="en-US" dirty="0" err="1"/>
+              <a:t>Colab</a:t>
+            </a:r>
+            <a:r>
+              <a:rPr lang="en-US" dirty="0"/>
+              <a:t> notebooks with others by providing a link – </a:t>
+            </a:r>
+            <a:r>
+              <a:rPr lang="en-US" dirty="0" err="1"/>
+              <a:t>sseful</a:t>
+            </a:r>
+            <a:r>
+              <a:rPr lang="en-US" dirty="0"/>
+              <a:t> for sharing code, data analysis, tutorials…</a:t>
+            </a:r>
           </a:p>
         </p:txBody>
       </p:sp>
     </p:spTree>
     <p:extLst>
       <p:ext uri="{BB962C8B-B14F-4D97-AF65-F5344CB8AC3E}">
-        <p14:creationId xmlns:p14="http://schemas.microsoft.com/office/powerpoint/2010/main" val="2744809447"/>
+        <p14:creationId xmlns:p14="http://schemas.microsoft.com/office/powerpoint/2010/main" val="2183295112"/>
       </p:ext>
     </p:extLst>
   </p:cSld>
@@ -4131,7 +4654,7 @@
           <p:cNvPr id="2" name="Title 1">
             <a:extLst>
               <a:ext uri="{FF2B5EF4-FFF2-40B4-BE49-F238E27FC236}">
-                <a16:creationId xmlns:a16="http://schemas.microsoft.com/office/drawing/2014/main" id="{80DC2872-743C-36D1-0444-3E9D0ECE1948}"/>
+                <a16:creationId xmlns:a16="http://schemas.microsoft.com/office/drawing/2014/main" id="{2DABBDBF-418C-2E39-1FF5-CF3D4226E83D}"/>
               </a:ext>
             </a:extLst>
           </p:cNvPr>
@@ -4149,45 +4672,85 @@
           <a:p>
             <a:r>
               <a:rPr lang="en-US" dirty="0"/>
-              <a:t>Survey</a:t>
-            </a:r>
-          </a:p>
-        </p:txBody>
-      </p:sp>
-      <p:sp>
-        <p:nvSpPr>
-          <p:cNvPr id="3" name="Content Placeholder 2">
-            <a:extLst>
-              <a:ext uri="{FF2B5EF4-FFF2-40B4-BE49-F238E27FC236}">
-                <a16:creationId xmlns:a16="http://schemas.microsoft.com/office/drawing/2014/main" id="{ECC54183-21E1-B791-CF8D-7E45DB79AE12}"/>
-              </a:ext>
-            </a:extLst>
-          </p:cNvPr>
-          <p:cNvSpPr>
-            <a:spLocks noGrp="1"/>
-          </p:cNvSpPr>
+              <a:t>Kaggle</a:t>
+            </a:r>
+          </a:p>
+        </p:txBody>
+      </p:sp>
+      <p:pic>
+        <p:nvPicPr>
+          <p:cNvPr id="5" name="Content Placeholder 4" descr="A screenshot of a website&#10;&#10;Description automatically generated">
+            <a:extLst>
+              <a:ext uri="{FF2B5EF4-FFF2-40B4-BE49-F238E27FC236}">
+                <a16:creationId xmlns:a16="http://schemas.microsoft.com/office/drawing/2014/main" id="{C98D65B5-48AD-5794-347D-99C1781EA599}"/>
+              </a:ext>
+            </a:extLst>
+          </p:cNvPr>
+          <p:cNvPicPr>
+            <a:picLocks noGrp="1" noChangeAspect="1"/>
+          </p:cNvPicPr>
           <p:nvPr>
             <p:ph idx="1"/>
           </p:nvPr>
-        </p:nvSpPr>
-        <p:spPr/>
-        <p:txBody>
-          <a:bodyPr/>
-          <a:lstStyle/>
-          <a:p>
-            <a:r>
-              <a:rPr lang="en-US" dirty="0"/>
-              <a:t>Don’t forget to do the survey:</a:t>
-            </a:r>
-          </a:p>
-          <a:p>
-            <a:r>
-              <a:rPr lang="en-US" dirty="0"/>
-              <a:t>Canvas -&gt; Modules -&gt; </a:t>
-            </a:r>
-            <a:r>
-              <a:rPr lang="en-US"/>
-              <a:t>Workshop Survey</a:t>
+        </p:nvPicPr>
+        <p:blipFill>
+          <a:blip r:embed="rId2">
+            <a:extLst>
+              <a:ext uri="{28A0092B-C50C-407E-A947-70E740481C1C}">
+                <a14:useLocalDpi xmlns:a14="http://schemas.microsoft.com/office/drawing/2010/main" val="0"/>
+              </a:ext>
+            </a:extLst>
+          </a:blip>
+          <a:stretch>
+            <a:fillRect/>
+          </a:stretch>
+        </p:blipFill>
+        <p:spPr>
+          <a:xfrm>
+            <a:off x="5035903" y="1690688"/>
+            <a:ext cx="6024929" cy="4351338"/>
+          </a:xfrm>
+        </p:spPr>
+      </p:pic>
+      <p:sp>
+        <p:nvSpPr>
+          <p:cNvPr id="7" name="TextBox 6">
+            <a:extLst>
+              <a:ext uri="{FF2B5EF4-FFF2-40B4-BE49-F238E27FC236}">
+                <a16:creationId xmlns:a16="http://schemas.microsoft.com/office/drawing/2014/main" id="{014B47D2-2325-C4A4-C04B-C68FBAC2E71D}"/>
+              </a:ext>
+            </a:extLst>
+          </p:cNvPr>
+          <p:cNvSpPr txBox="1"/>
+          <p:nvPr/>
+        </p:nvSpPr>
+        <p:spPr>
+          <a:xfrm>
+            <a:off x="838200" y="1690688"/>
+            <a:ext cx="4197703" cy="369332"/>
+          </a:xfrm>
+          <a:prstGeom prst="rect">
+            <a:avLst/>
+          </a:prstGeom>
+          <a:noFill/>
+        </p:spPr>
+        <p:txBody>
+          <a:bodyPr wrap="square">
+            <a:spAutoFit/>
+          </a:bodyPr>
+          <a:lstStyle/>
+          <a:p>
+            <a:r>
+              <a:rPr lang="en-US" dirty="0"/>
+              <a:t>https://</a:t>
+            </a:r>
+            <a:r>
+              <a:rPr lang="en-US" dirty="0" err="1"/>
+              <a:t>www.kaggle.com</a:t>
+            </a:r>
+            <a:r>
+              <a:rPr lang="en-US" dirty="0"/>
+              <a:t>/</a:t>
             </a:r>
           </a:p>
         </p:txBody>
@@ -4195,7 +4758,7 @@
     </p:spTree>
     <p:extLst>
       <p:ext uri="{BB962C8B-B14F-4D97-AF65-F5344CB8AC3E}">
-        <p14:creationId xmlns:p14="http://schemas.microsoft.com/office/powerpoint/2010/main" val="424450038"/>
+        <p14:creationId xmlns:p14="http://schemas.microsoft.com/office/powerpoint/2010/main" val="637003358"/>
       </p:ext>
     </p:extLst>
   </p:cSld>
@@ -4227,7 +4790,7 @@
           <p:cNvPr id="2" name="Title 1">
             <a:extLst>
               <a:ext uri="{FF2B5EF4-FFF2-40B4-BE49-F238E27FC236}">
-                <a16:creationId xmlns:a16="http://schemas.microsoft.com/office/drawing/2014/main" id="{E71D7ADC-133D-00DC-234D-8F348B545FAC}"/>
+                <a16:creationId xmlns:a16="http://schemas.microsoft.com/office/drawing/2014/main" id="{CECE4000-4C2A-CA04-46EB-6BAE9EACB0C9}"/>
               </a:ext>
             </a:extLst>
           </p:cNvPr>
@@ -4245,68 +4808,85 @@
           <a:p>
             <a:r>
               <a:rPr lang="en-US" dirty="0"/>
-              <a:t>Useful Resources</a:t>
-            </a:r>
-          </a:p>
-        </p:txBody>
-      </p:sp>
-      <p:sp>
-        <p:nvSpPr>
-          <p:cNvPr id="3" name="Content Placeholder 2">
-            <a:extLst>
-              <a:ext uri="{FF2B5EF4-FFF2-40B4-BE49-F238E27FC236}">
-                <a16:creationId xmlns:a16="http://schemas.microsoft.com/office/drawing/2014/main" id="{7F7F5108-BCDA-5767-A111-099393B651EE}"/>
-              </a:ext>
-            </a:extLst>
-          </p:cNvPr>
-          <p:cNvSpPr>
-            <a:spLocks noGrp="1"/>
-          </p:cNvSpPr>
+              <a:t>Hugging Face</a:t>
+            </a:r>
+          </a:p>
+        </p:txBody>
+      </p:sp>
+      <p:pic>
+        <p:nvPicPr>
+          <p:cNvPr id="5" name="Content Placeholder 4" descr="A screenshot of a computer&#10;&#10;Description automatically generated">
+            <a:extLst>
+              <a:ext uri="{FF2B5EF4-FFF2-40B4-BE49-F238E27FC236}">
+                <a16:creationId xmlns:a16="http://schemas.microsoft.com/office/drawing/2014/main" id="{195653C8-BDBD-2D08-C573-93F0A7D70DED}"/>
+              </a:ext>
+            </a:extLst>
+          </p:cNvPr>
+          <p:cNvPicPr>
+            <a:picLocks noGrp="1" noChangeAspect="1"/>
+          </p:cNvPicPr>
           <p:nvPr>
             <p:ph idx="1"/>
           </p:nvPr>
-        </p:nvSpPr>
-        <p:spPr/>
-        <p:txBody>
-          <a:bodyPr/>
-          <a:lstStyle/>
-          <a:p>
+        </p:nvPicPr>
+        <p:blipFill>
+          <a:blip r:embed="rId2">
+            <a:extLst>
+              <a:ext uri="{28A0092B-C50C-407E-A947-70E740481C1C}">
+                <a14:useLocalDpi xmlns:a14="http://schemas.microsoft.com/office/drawing/2010/main" val="0"/>
+              </a:ext>
+            </a:extLst>
+          </a:blip>
+          <a:stretch>
+            <a:fillRect/>
+          </a:stretch>
+        </p:blipFill>
+        <p:spPr>
+          <a:xfrm>
+            <a:off x="6157478" y="1927640"/>
+            <a:ext cx="5196322" cy="4351338"/>
+          </a:xfrm>
+        </p:spPr>
+      </p:pic>
+      <p:sp>
+        <p:nvSpPr>
+          <p:cNvPr id="7" name="TextBox 6">
+            <a:extLst>
+              <a:ext uri="{FF2B5EF4-FFF2-40B4-BE49-F238E27FC236}">
+                <a16:creationId xmlns:a16="http://schemas.microsoft.com/office/drawing/2014/main" id="{FFBD0324-3A46-13F0-A1FB-CA968F9ED805}"/>
+              </a:ext>
+            </a:extLst>
+          </p:cNvPr>
+          <p:cNvSpPr txBox="1"/>
+          <p:nvPr/>
+        </p:nvSpPr>
+        <p:spPr>
+          <a:xfrm>
+            <a:off x="838200" y="2106650"/>
+            <a:ext cx="4797056" cy="369332"/>
+          </a:xfrm>
+          <a:prstGeom prst="rect">
+            <a:avLst/>
+          </a:prstGeom>
+          <a:noFill/>
+        </p:spPr>
+        <p:txBody>
+          <a:bodyPr wrap="square">
+            <a:spAutoFit/>
+          </a:bodyPr>
+          <a:lstStyle/>
+          <a:p>
+            <a:r>
+              <a:rPr lang="en-US" dirty="0"/>
+              <a:t>https://</a:t>
+            </a:r>
             <a:r>
               <a:rPr lang="en-US" dirty="0" err="1"/>
-              <a:t>HuggingFace</a:t>
-            </a:r>
-            <a:r>
-              <a:rPr lang="en-US" dirty="0"/>
-              <a:t> Spaces</a:t>
-            </a:r>
-          </a:p>
-          <a:p>
-            <a:r>
-              <a:rPr lang="en-US" dirty="0"/>
-              <a:t>Google </a:t>
-            </a:r>
-            <a:r>
-              <a:rPr lang="en-US" dirty="0" err="1"/>
-              <a:t>colab</a:t>
-            </a:r>
-            <a:endParaRPr lang="en-US" dirty="0"/>
-          </a:p>
-          <a:p>
-            <a:r>
-              <a:rPr lang="en-US" dirty="0"/>
-              <a:t>Kaggle?</a:t>
-            </a:r>
-          </a:p>
-          <a:p>
-            <a:r>
-              <a:rPr lang="en-US" dirty="0">
-                <a:hlinkClick r:id="rId2"/>
-              </a:rPr>
-              <a:t>https://www.youtube.com/@DigitalSreeni</a:t>
-            </a:r>
-            <a:r>
-              <a:rPr lang="en-US" dirty="0"/>
-              <a:t> </a:t>
+              <a:t>huggingface.co</a:t>
+            </a:r>
+            <a:r>
+              <a:rPr lang="en-US" dirty="0"/>
+              <a:t>/</a:t>
             </a:r>
           </a:p>
         </p:txBody>
@@ -4314,7 +4894,275 @@
     </p:spTree>
     <p:extLst>
       <p:ext uri="{BB962C8B-B14F-4D97-AF65-F5344CB8AC3E}">
-        <p14:creationId xmlns:p14="http://schemas.microsoft.com/office/powerpoint/2010/main" val="3720613051"/>
+        <p14:creationId xmlns:p14="http://schemas.microsoft.com/office/powerpoint/2010/main" val="3512935006"/>
+      </p:ext>
+    </p:extLst>
+  </p:cSld>
+  <p:clrMapOvr>
+    <a:masterClrMapping/>
+  </p:clrMapOvr>
+</p:sld>
+</file>
+
+<file path=ppt/slides/slide9.xml><?xml version="1.0" encoding="utf-8"?>
+<p:sld xmlns:a="http://schemas.openxmlformats.org/drawingml/2006/main" xmlns:r="http://schemas.openxmlformats.org/officeDocument/2006/relationships" xmlns:p="http://schemas.openxmlformats.org/presentationml/2006/main">
+  <p:cSld>
+    <p:spTree>
+      <p:nvGrpSpPr>
+        <p:cNvPr id="1" name=""/>
+        <p:cNvGrpSpPr/>
+        <p:nvPr/>
+      </p:nvGrpSpPr>
+      <p:grpSpPr>
+        <a:xfrm>
+          <a:off x="0" y="0"/>
+          <a:ext cx="0" cy="0"/>
+          <a:chOff x="0" y="0"/>
+          <a:chExt cx="0" cy="0"/>
+        </a:xfrm>
+      </p:grpSpPr>
+      <p:sp>
+        <p:nvSpPr>
+          <p:cNvPr id="2" name="Title 1">
+            <a:extLst>
+              <a:ext uri="{FF2B5EF4-FFF2-40B4-BE49-F238E27FC236}">
+                <a16:creationId xmlns:a16="http://schemas.microsoft.com/office/drawing/2014/main" id="{80DC2872-743C-36D1-0444-3E9D0ECE1948}"/>
+              </a:ext>
+            </a:extLst>
+          </p:cNvPr>
+          <p:cNvSpPr>
+            <a:spLocks noGrp="1"/>
+          </p:cNvSpPr>
+          <p:nvPr>
+            <p:ph type="title"/>
+          </p:nvPr>
+        </p:nvSpPr>
+        <p:spPr/>
+        <p:txBody>
+          <a:bodyPr/>
+          <a:lstStyle/>
+          <a:p>
+            <a:r>
+              <a:rPr lang="en-US" dirty="0"/>
+              <a:t>Survey</a:t>
+            </a:r>
+          </a:p>
+        </p:txBody>
+      </p:sp>
+      <p:sp>
+        <p:nvSpPr>
+          <p:cNvPr id="3" name="Content Placeholder 2">
+            <a:extLst>
+              <a:ext uri="{FF2B5EF4-FFF2-40B4-BE49-F238E27FC236}">
+                <a16:creationId xmlns:a16="http://schemas.microsoft.com/office/drawing/2014/main" id="{ECC54183-21E1-B791-CF8D-7E45DB79AE12}"/>
+              </a:ext>
+            </a:extLst>
+          </p:cNvPr>
+          <p:cNvSpPr>
+            <a:spLocks noGrp="1"/>
+          </p:cNvSpPr>
+          <p:nvPr>
+            <p:ph idx="1"/>
+          </p:nvPr>
+        </p:nvSpPr>
+        <p:spPr/>
+        <p:txBody>
+          <a:bodyPr/>
+          <a:lstStyle/>
+          <a:p>
+            <a:r>
+              <a:rPr lang="en-US" dirty="0"/>
+              <a:t>Don’t forget to do the survey:</a:t>
+            </a:r>
+          </a:p>
+          <a:p>
+            <a:r>
+              <a:rPr lang="en-US" dirty="0"/>
+              <a:t>Canvas -&gt; Modules -&gt; Workshop Survey</a:t>
+            </a:r>
+          </a:p>
+        </p:txBody>
+      </p:sp>
+      <p:pic>
+        <p:nvPicPr>
+          <p:cNvPr id="5" name="Picture 4" descr="A screenshot of a computer&#10;&#10;Description automatically generated">
+            <a:extLst>
+              <a:ext uri="{FF2B5EF4-FFF2-40B4-BE49-F238E27FC236}">
+                <a16:creationId xmlns:a16="http://schemas.microsoft.com/office/drawing/2014/main" id="{02497146-A6CA-D3D4-4DF0-E5EB9021143A}"/>
+              </a:ext>
+            </a:extLst>
+          </p:cNvPr>
+          <p:cNvPicPr>
+            <a:picLocks noChangeAspect="1"/>
+          </p:cNvPicPr>
+          <p:nvPr/>
+        </p:nvPicPr>
+        <p:blipFill>
+          <a:blip r:embed="rId2">
+            <a:extLst>
+              <a:ext uri="{28A0092B-C50C-407E-A947-70E740481C1C}">
+                <a14:useLocalDpi xmlns:a14="http://schemas.microsoft.com/office/drawing/2010/main" val="0"/>
+              </a:ext>
+            </a:extLst>
+          </a:blip>
+          <a:stretch>
+            <a:fillRect/>
+          </a:stretch>
+        </p:blipFill>
+        <p:spPr>
+          <a:xfrm>
+            <a:off x="838200" y="3072741"/>
+            <a:ext cx="5107473" cy="2747963"/>
+          </a:xfrm>
+          <a:prstGeom prst="rect">
+            <a:avLst/>
+          </a:prstGeom>
+        </p:spPr>
+      </p:pic>
+      <p:pic>
+        <p:nvPicPr>
+          <p:cNvPr id="7" name="Picture 6" descr="A screenshot of a computer&#10;&#10;Description automatically generated">
+            <a:extLst>
+              <a:ext uri="{FF2B5EF4-FFF2-40B4-BE49-F238E27FC236}">
+                <a16:creationId xmlns:a16="http://schemas.microsoft.com/office/drawing/2014/main" id="{35D884AD-63CB-95D7-EA6C-1DCCBE1AE038}"/>
+              </a:ext>
+            </a:extLst>
+          </p:cNvPr>
+          <p:cNvPicPr>
+            <a:picLocks noChangeAspect="1"/>
+          </p:cNvPicPr>
+          <p:nvPr/>
+        </p:nvPicPr>
+        <p:blipFill>
+          <a:blip r:embed="rId3">
+            <a:extLst>
+              <a:ext uri="{28A0092B-C50C-407E-A947-70E740481C1C}">
+                <a14:useLocalDpi xmlns:a14="http://schemas.microsoft.com/office/drawing/2010/main" val="0"/>
+              </a:ext>
+            </a:extLst>
+          </a:blip>
+          <a:stretch>
+            <a:fillRect/>
+          </a:stretch>
+        </p:blipFill>
+        <p:spPr>
+          <a:xfrm>
+            <a:off x="6436560" y="3072741"/>
+            <a:ext cx="5080869" cy="2747963"/>
+          </a:xfrm>
+          <a:prstGeom prst="rect">
+            <a:avLst/>
+          </a:prstGeom>
+        </p:spPr>
+      </p:pic>
+      <p:sp>
+        <p:nvSpPr>
+          <p:cNvPr id="8" name="Rectangle 7">
+            <a:extLst>
+              <a:ext uri="{FF2B5EF4-FFF2-40B4-BE49-F238E27FC236}">
+                <a16:creationId xmlns:a16="http://schemas.microsoft.com/office/drawing/2014/main" id="{43AD5A25-5C81-045B-2EED-3C4608D252B0}"/>
+              </a:ext>
+            </a:extLst>
+          </p:cNvPr>
+          <p:cNvSpPr/>
+          <p:nvPr/>
+        </p:nvSpPr>
+        <p:spPr>
+          <a:xfrm>
+            <a:off x="1187532" y="3693226"/>
+            <a:ext cx="332510" cy="130629"/>
+          </a:xfrm>
+          <a:prstGeom prst="rect">
+            <a:avLst/>
+          </a:prstGeom>
+          <a:noFill/>
+          <a:ln w="38100">
+            <a:solidFill>
+              <a:srgbClr val="FF0000"/>
+            </a:solidFill>
+          </a:ln>
+        </p:spPr>
+        <p:style>
+          <a:lnRef idx="2">
+            <a:schemeClr val="accent1">
+              <a:shade val="15000"/>
+            </a:schemeClr>
+          </a:lnRef>
+          <a:fillRef idx="1">
+            <a:schemeClr val="accent1"/>
+          </a:fillRef>
+          <a:effectRef idx="0">
+            <a:schemeClr val="accent1"/>
+          </a:effectRef>
+          <a:fontRef idx="minor">
+            <a:schemeClr val="lt1"/>
+          </a:fontRef>
+        </p:style>
+        <p:txBody>
+          <a:bodyPr rtlCol="0" anchor="ctr"/>
+          <a:lstStyle/>
+          <a:p>
+            <a:pPr algn="ctr"/>
+            <a:endParaRPr lang="en-US"/>
+          </a:p>
+        </p:txBody>
+      </p:sp>
+      <p:sp>
+        <p:nvSpPr>
+          <p:cNvPr id="9" name="Rectangle 8">
+            <a:extLst>
+              <a:ext uri="{FF2B5EF4-FFF2-40B4-BE49-F238E27FC236}">
+                <a16:creationId xmlns:a16="http://schemas.microsoft.com/office/drawing/2014/main" id="{FE0A5C5A-1B13-1E83-CA44-BAFA3F69A7F2}"/>
+              </a:ext>
+            </a:extLst>
+          </p:cNvPr>
+          <p:cNvSpPr/>
+          <p:nvPr/>
+        </p:nvSpPr>
+        <p:spPr>
+          <a:xfrm>
+            <a:off x="7562591" y="4000002"/>
+            <a:ext cx="1735787" cy="144486"/>
+          </a:xfrm>
+          <a:prstGeom prst="rect">
+            <a:avLst/>
+          </a:prstGeom>
+          <a:noFill/>
+          <a:ln w="38100">
+            <a:solidFill>
+              <a:srgbClr val="FF0000"/>
+            </a:solidFill>
+          </a:ln>
+        </p:spPr>
+        <p:style>
+          <a:lnRef idx="2">
+            <a:schemeClr val="accent1">
+              <a:shade val="15000"/>
+            </a:schemeClr>
+          </a:lnRef>
+          <a:fillRef idx="1">
+            <a:schemeClr val="accent1"/>
+          </a:fillRef>
+          <a:effectRef idx="0">
+            <a:schemeClr val="accent1"/>
+          </a:effectRef>
+          <a:fontRef idx="minor">
+            <a:schemeClr val="lt1"/>
+          </a:fontRef>
+        </p:style>
+        <p:txBody>
+          <a:bodyPr rtlCol="0" anchor="ctr"/>
+          <a:lstStyle/>
+          <a:p>
+            <a:pPr algn="ctr"/>
+            <a:endParaRPr lang="en-US"/>
+          </a:p>
+        </p:txBody>
+      </p:sp>
+    </p:spTree>
+    <p:extLst>
+      <p:ext uri="{BB962C8B-B14F-4D97-AF65-F5344CB8AC3E}">
+        <p14:creationId xmlns:p14="http://schemas.microsoft.com/office/powerpoint/2010/main" val="424450038"/>
       </p:ext>
     </p:extLst>
   </p:cSld>

</xml_diff>